<commit_message>
header and pragrpaph done
</commit_message>
<xml_diff>
--- a/HTML BASICS.pptx
+++ b/HTML BASICS.pptx
@@ -28,6 +28,14 @@
     <p:sldId id="276" r:id="rId22"/>
     <p:sldId id="277" r:id="rId23"/>
     <p:sldId id="278" r:id="rId24"/>
+    <p:sldId id="279" r:id="rId25"/>
+    <p:sldId id="280" r:id="rId26"/>
+    <p:sldId id="281" r:id="rId27"/>
+    <p:sldId id="282" r:id="rId28"/>
+    <p:sldId id="283" r:id="rId29"/>
+    <p:sldId id="284" r:id="rId30"/>
+    <p:sldId id="285" r:id="rId31"/>
+    <p:sldId id="286" r:id="rId32"/>
   </p:sldIdLst>
   <p:sldSz cx="12192000" cy="6858000"/>
   <p:notesSz cx="6858000" cy="9144000"/>
@@ -304,7 +312,7 @@
             <a:fld id="{87DE6118-2437-4B30-8E3C-4D2BE6020583}" type="datetimeFigureOut">
               <a:rPr lang="en-US" dirty="0"/>
               <a:pPr/>
-              <a:t>9/2/2021</a:t>
+              <a:t>9/5/2021</a:t>
             </a:fld>
             <a:endParaRPr lang="en-US" dirty="0"/>
           </a:p>
@@ -630,7 +638,7 @@
           <a:p>
             <a:fld id="{87DE6118-2437-4B30-8E3C-4D2BE6020583}" type="datetimeFigureOut">
               <a:rPr lang="en-US" dirty="0"/>
-              <a:t>9/2/2021</a:t>
+              <a:t>9/5/2021</a:t>
             </a:fld>
             <a:endParaRPr lang="en-US" dirty="0"/>
           </a:p>
@@ -805,7 +813,7 @@
           <a:p>
             <a:fld id="{87DE6118-2437-4B30-8E3C-4D2BE6020583}" type="datetimeFigureOut">
               <a:rPr lang="en-US" dirty="0"/>
-              <a:t>9/2/2021</a:t>
+              <a:t>9/5/2021</a:t>
             </a:fld>
             <a:endParaRPr lang="en-US" dirty="0"/>
           </a:p>
@@ -970,7 +978,7 @@
           <a:p>
             <a:fld id="{87DE6118-2437-4B30-8E3C-4D2BE6020583}" type="datetimeFigureOut">
               <a:rPr lang="en-US" dirty="0"/>
-              <a:t>9/2/2021</a:t>
+              <a:t>9/5/2021</a:t>
             </a:fld>
             <a:endParaRPr lang="en-US" dirty="0"/>
           </a:p>
@@ -1243,7 +1251,7 @@
             <a:fld id="{87DE6118-2437-4B30-8E3C-4D2BE6020583}" type="datetimeFigureOut">
               <a:rPr lang="en-US" dirty="0"/>
               <a:pPr/>
-              <a:t>9/2/2021</a:t>
+              <a:t>9/5/2021</a:t>
             </a:fld>
             <a:endParaRPr lang="en-US" dirty="0"/>
           </a:p>
@@ -1633,7 +1641,7 @@
           <a:p>
             <a:fld id="{87DE6118-2437-4B30-8E3C-4D2BE6020583}" type="datetimeFigureOut">
               <a:rPr lang="en-US" dirty="0"/>
-              <a:t>9/2/2021</a:t>
+              <a:t>9/5/2021</a:t>
             </a:fld>
             <a:endParaRPr lang="en-US" dirty="0"/>
           </a:p>
@@ -2105,7 +2113,7 @@
           <a:p>
             <a:fld id="{87DE6118-2437-4B30-8E3C-4D2BE6020583}" type="datetimeFigureOut">
               <a:rPr lang="en-US" dirty="0"/>
-              <a:t>9/2/2021</a:t>
+              <a:t>9/5/2021</a:t>
             </a:fld>
             <a:endParaRPr lang="en-US" dirty="0"/>
           </a:p>
@@ -2218,7 +2226,7 @@
           <a:p>
             <a:fld id="{87DE6118-2437-4B30-8E3C-4D2BE6020583}" type="datetimeFigureOut">
               <a:rPr lang="en-US" dirty="0"/>
-              <a:t>9/2/2021</a:t>
+              <a:t>9/5/2021</a:t>
             </a:fld>
             <a:endParaRPr lang="en-US" dirty="0"/>
           </a:p>
@@ -2308,7 +2316,7 @@
           <a:p>
             <a:fld id="{87DE6118-2437-4B30-8E3C-4D2BE6020583}" type="datetimeFigureOut">
               <a:rPr lang="en-US" dirty="0"/>
-              <a:t>9/2/2021</a:t>
+              <a:t>9/5/2021</a:t>
             </a:fld>
             <a:endParaRPr lang="en-US" dirty="0"/>
           </a:p>
@@ -2650,7 +2658,7 @@
             <a:fld id="{87DE6118-2437-4B30-8E3C-4D2BE6020583}" type="datetimeFigureOut">
               <a:rPr lang="en-US" dirty="0"/>
               <a:pPr/>
-              <a:t>9/2/2021</a:t>
+              <a:t>9/5/2021</a:t>
             </a:fld>
             <a:endParaRPr lang="en-US" dirty="0"/>
           </a:p>
@@ -3035,7 +3043,7 @@
             <a:fld id="{87DE6118-2437-4B30-8E3C-4D2BE6020583}" type="datetimeFigureOut">
               <a:rPr lang="en-US" dirty="0"/>
               <a:pPr/>
-              <a:t>9/2/2021</a:t>
+              <a:t>9/5/2021</a:t>
             </a:fld>
             <a:endParaRPr lang="en-US" dirty="0"/>
           </a:p>
@@ -3310,7 +3318,7 @@
             <a:fld id="{87DE6118-2437-4B30-8E3C-4D2BE6020583}" type="datetimeFigureOut">
               <a:rPr lang="en-US" dirty="0"/>
               <a:pPr/>
-              <a:t>9/2/2021</a:t>
+              <a:t>9/5/2021</a:t>
             </a:fld>
             <a:endParaRPr lang="en-US" dirty="0"/>
           </a:p>
@@ -9192,6 +9200,774 @@
 </p:sld>
 </file>
 
+<file path=ppt/slides/slide24.xml><?xml version="1.0" encoding="utf-8"?>
+<p:sld xmlns:a="http://schemas.openxmlformats.org/drawingml/2006/main" xmlns:r="http://schemas.openxmlformats.org/officeDocument/2006/relationships" xmlns:p="http://schemas.openxmlformats.org/presentationml/2006/main">
+  <p:cSld>
+    <p:spTree>
+      <p:nvGrpSpPr>
+        <p:cNvPr id="1" name=""/>
+        <p:cNvGrpSpPr/>
+        <p:nvPr/>
+      </p:nvGrpSpPr>
+      <p:grpSpPr>
+        <a:xfrm>
+          <a:off x="0" y="0"/>
+          <a:ext cx="0" cy="0"/>
+          <a:chOff x="0" y="0"/>
+          <a:chExt cx="0" cy="0"/>
+        </a:xfrm>
+      </p:grpSpPr>
+      <p:sp>
+        <p:nvSpPr>
+          <p:cNvPr id="2" name="Title 1">
+            <a:extLst>
+              <a:ext uri="{FF2B5EF4-FFF2-40B4-BE49-F238E27FC236}">
+                <a16:creationId xmlns:a16="http://schemas.microsoft.com/office/drawing/2014/main" id="{9B3E5BCA-BB79-4494-943A-99CF5F49102F}"/>
+              </a:ext>
+            </a:extLst>
+          </p:cNvPr>
+          <p:cNvSpPr>
+            <a:spLocks noGrp="1"/>
+          </p:cNvSpPr>
+          <p:nvPr>
+            <p:ph type="ctrTitle"/>
+          </p:nvPr>
+        </p:nvSpPr>
+        <p:spPr>
+          <a:xfrm>
+            <a:off x="1915385" y="1058346"/>
+            <a:ext cx="8361229" cy="2098226"/>
+          </a:xfrm>
+        </p:spPr>
+        <p:txBody>
+          <a:bodyPr/>
+          <a:lstStyle/>
+          <a:p>
+            <a:r>
+              <a:rPr lang="en-PH" dirty="0"/>
+              <a:t>HTML BASICS</a:t>
+            </a:r>
+          </a:p>
+        </p:txBody>
+      </p:sp>
+      <p:sp>
+        <p:nvSpPr>
+          <p:cNvPr id="3" name="Subtitle 2">
+            <a:extLst>
+              <a:ext uri="{FF2B5EF4-FFF2-40B4-BE49-F238E27FC236}">
+                <a16:creationId xmlns:a16="http://schemas.microsoft.com/office/drawing/2014/main" id="{AEC855E7-1E83-4728-BDA9-FB3D80108F3A}"/>
+              </a:ext>
+            </a:extLst>
+          </p:cNvPr>
+          <p:cNvSpPr>
+            <a:spLocks noGrp="1"/>
+          </p:cNvSpPr>
+          <p:nvPr>
+            <p:ph type="subTitle" idx="1"/>
+          </p:nvPr>
+        </p:nvSpPr>
+        <p:spPr>
+          <a:xfrm>
+            <a:off x="6685849" y="5338765"/>
+            <a:ext cx="6831673" cy="1086237"/>
+          </a:xfrm>
+        </p:spPr>
+        <p:txBody>
+          <a:bodyPr/>
+          <a:lstStyle/>
+          <a:p>
+            <a:r>
+              <a:rPr lang="en-PH" dirty="0"/>
+              <a:t>By Ronald Laz</a:t>
+            </a:r>
+          </a:p>
+        </p:txBody>
+      </p:sp>
+      <p:sp>
+        <p:nvSpPr>
+          <p:cNvPr id="4" name="Title 1">
+            <a:extLst>
+              <a:ext uri="{FF2B5EF4-FFF2-40B4-BE49-F238E27FC236}">
+                <a16:creationId xmlns:a16="http://schemas.microsoft.com/office/drawing/2014/main" id="{110DDF52-F283-4292-9D4B-49FAAD7F1EFF}"/>
+              </a:ext>
+            </a:extLst>
+          </p:cNvPr>
+          <p:cNvSpPr txBox="1">
+            <a:spLocks/>
+          </p:cNvSpPr>
+          <p:nvPr/>
+        </p:nvSpPr>
+        <p:spPr>
+          <a:xfrm>
+            <a:off x="1915384" y="3083203"/>
+            <a:ext cx="8361229" cy="544856"/>
+          </a:xfrm>
+          <a:prstGeom prst="rect">
+            <a:avLst/>
+          </a:prstGeom>
+        </p:spPr>
+        <p:txBody>
+          <a:bodyPr vert="horz" lIns="91440" tIns="45720" rIns="91440" bIns="45720" rtlCol="0" anchor="b">
+            <a:noAutofit/>
+          </a:bodyPr>
+          <a:lstStyle>
+            <a:lvl1pPr algn="ctr" defTabSz="914400" rtl="0" eaLnBrk="1" latinLnBrk="0" hangingPunct="1">
+              <a:lnSpc>
+                <a:spcPct val="89000"/>
+              </a:lnSpc>
+              <a:spcBef>
+                <a:spcPct val="0"/>
+              </a:spcBef>
+              <a:buNone/>
+              <a:defRPr sz="7200" kern="1200" cap="all" baseline="0">
+                <a:solidFill>
+                  <a:schemeClr val="tx2"/>
+                </a:solidFill>
+                <a:latin typeface="+mj-lt"/>
+                <a:ea typeface="+mj-ea"/>
+                <a:cs typeface="+mj-cs"/>
+              </a:defRPr>
+            </a:lvl1pPr>
+          </a:lstStyle>
+          <a:p>
+            <a:r>
+              <a:rPr lang="en-PH" sz="2800" dirty="0"/>
+              <a:t>Tags you can find inside the html body</a:t>
+            </a:r>
+          </a:p>
+        </p:txBody>
+      </p:sp>
+      <p:sp>
+        <p:nvSpPr>
+          <p:cNvPr id="5" name="Title 1">
+            <a:extLst>
+              <a:ext uri="{FF2B5EF4-FFF2-40B4-BE49-F238E27FC236}">
+                <a16:creationId xmlns:a16="http://schemas.microsoft.com/office/drawing/2014/main" id="{7E2D6452-5B08-4DCC-8B59-CDB8325E0C9A}"/>
+              </a:ext>
+            </a:extLst>
+          </p:cNvPr>
+          <p:cNvSpPr txBox="1">
+            <a:spLocks/>
+          </p:cNvSpPr>
+          <p:nvPr/>
+        </p:nvSpPr>
+        <p:spPr>
+          <a:xfrm>
+            <a:off x="1915384" y="3306078"/>
+            <a:ext cx="8361229" cy="544856"/>
+          </a:xfrm>
+          <a:prstGeom prst="rect">
+            <a:avLst/>
+          </a:prstGeom>
+        </p:spPr>
+        <p:txBody>
+          <a:bodyPr vert="horz" lIns="91440" tIns="45720" rIns="91440" bIns="45720" rtlCol="0" anchor="b">
+            <a:noAutofit/>
+          </a:bodyPr>
+          <a:lstStyle>
+            <a:lvl1pPr algn="ctr" defTabSz="914400" rtl="0" eaLnBrk="1" latinLnBrk="0" hangingPunct="1">
+              <a:lnSpc>
+                <a:spcPct val="89000"/>
+              </a:lnSpc>
+              <a:spcBef>
+                <a:spcPct val="0"/>
+              </a:spcBef>
+              <a:buNone/>
+              <a:defRPr sz="7200" kern="1200" cap="all" baseline="0">
+                <a:solidFill>
+                  <a:schemeClr val="tx2"/>
+                </a:solidFill>
+                <a:latin typeface="+mj-lt"/>
+                <a:ea typeface="+mj-ea"/>
+                <a:cs typeface="+mj-cs"/>
+              </a:defRPr>
+            </a:lvl1pPr>
+          </a:lstStyle>
+          <a:p>
+            <a:r>
+              <a:rPr lang="en-PH" sz="1800" dirty="0">
+                <a:solidFill>
+                  <a:srgbClr val="FF0000"/>
+                </a:solidFill>
+              </a:rPr>
+              <a:t>PART 1</a:t>
+            </a:r>
+          </a:p>
+        </p:txBody>
+      </p:sp>
+    </p:spTree>
+    <p:extLst>
+      <p:ext uri="{BB962C8B-B14F-4D97-AF65-F5344CB8AC3E}">
+        <p14:creationId xmlns:p14="http://schemas.microsoft.com/office/powerpoint/2010/main" val="2586506770"/>
+      </p:ext>
+    </p:extLst>
+  </p:cSld>
+  <p:clrMapOvr>
+    <a:masterClrMapping/>
+  </p:clrMapOvr>
+</p:sld>
+</file>
+
+<file path=ppt/slides/slide25.xml><?xml version="1.0" encoding="utf-8"?>
+<p:sld xmlns:a="http://schemas.openxmlformats.org/drawingml/2006/main" xmlns:r="http://schemas.openxmlformats.org/officeDocument/2006/relationships" xmlns:p="http://schemas.openxmlformats.org/presentationml/2006/main">
+  <p:cSld>
+    <p:spTree>
+      <p:nvGrpSpPr>
+        <p:cNvPr id="1" name=""/>
+        <p:cNvGrpSpPr/>
+        <p:nvPr/>
+      </p:nvGrpSpPr>
+      <p:grpSpPr>
+        <a:xfrm>
+          <a:off x="0" y="0"/>
+          <a:ext cx="0" cy="0"/>
+          <a:chOff x="0" y="0"/>
+          <a:chExt cx="0" cy="0"/>
+        </a:xfrm>
+      </p:grpSpPr>
+      <p:sp>
+        <p:nvSpPr>
+          <p:cNvPr id="2" name="Title 1">
+            <a:extLst>
+              <a:ext uri="{FF2B5EF4-FFF2-40B4-BE49-F238E27FC236}">
+                <a16:creationId xmlns:a16="http://schemas.microsoft.com/office/drawing/2014/main" id="{1D944047-79F1-4C8A-8190-4DAE317E7E2B}"/>
+              </a:ext>
+            </a:extLst>
+          </p:cNvPr>
+          <p:cNvSpPr>
+            <a:spLocks noGrp="1"/>
+          </p:cNvSpPr>
+          <p:nvPr>
+            <p:ph type="title"/>
+          </p:nvPr>
+        </p:nvSpPr>
+        <p:spPr>
+          <a:xfrm>
+            <a:off x="3825948" y="4735655"/>
+            <a:ext cx="4743893" cy="792126"/>
+          </a:xfrm>
+        </p:spPr>
+        <p:txBody>
+          <a:bodyPr/>
+          <a:lstStyle/>
+          <a:p>
+            <a:r>
+              <a:rPr lang="en-PH" sz="2400" dirty="0"/>
+              <a:t>1 is the biggest – 6 is the smallest </a:t>
+            </a:r>
+            <a:endParaRPr lang="en-PH" dirty="0"/>
+          </a:p>
+        </p:txBody>
+      </p:sp>
+      <p:sp>
+        <p:nvSpPr>
+          <p:cNvPr id="6" name="Title 1">
+            <a:extLst>
+              <a:ext uri="{FF2B5EF4-FFF2-40B4-BE49-F238E27FC236}">
+                <a16:creationId xmlns:a16="http://schemas.microsoft.com/office/drawing/2014/main" id="{0389ED01-1ECF-4B02-BCA0-58952D5E39F4}"/>
+              </a:ext>
+            </a:extLst>
+          </p:cNvPr>
+          <p:cNvSpPr txBox="1">
+            <a:spLocks/>
+          </p:cNvSpPr>
+          <p:nvPr/>
+        </p:nvSpPr>
+        <p:spPr>
+          <a:xfrm>
+            <a:off x="1524000" y="838200"/>
+            <a:ext cx="9601200" cy="792126"/>
+          </a:xfrm>
+          <a:prstGeom prst="rect">
+            <a:avLst/>
+          </a:prstGeom>
+        </p:spPr>
+        <p:txBody>
+          <a:bodyPr vert="horz" lIns="91440" tIns="45720" rIns="91440" bIns="45720" rtlCol="0" anchor="t">
+            <a:normAutofit/>
+          </a:bodyPr>
+          <a:lstStyle>
+            <a:lvl1pPr algn="l" defTabSz="914400" rtl="0" eaLnBrk="1" latinLnBrk="0" hangingPunct="1">
+              <a:lnSpc>
+                <a:spcPct val="89000"/>
+              </a:lnSpc>
+              <a:spcBef>
+                <a:spcPct val="0"/>
+              </a:spcBef>
+              <a:buNone/>
+              <a:defRPr sz="4400" kern="1200" baseline="0">
+                <a:solidFill>
+                  <a:schemeClr val="tx2"/>
+                </a:solidFill>
+                <a:latin typeface="+mj-lt"/>
+                <a:ea typeface="+mj-ea"/>
+                <a:cs typeface="+mj-cs"/>
+              </a:defRPr>
+            </a:lvl1pPr>
+          </a:lstStyle>
+          <a:p>
+            <a:r>
+              <a:rPr lang="en-PH" dirty="0"/>
+              <a:t>Headers</a:t>
+            </a:r>
+          </a:p>
+        </p:txBody>
+      </p:sp>
+      <p:pic>
+        <p:nvPicPr>
+          <p:cNvPr id="12" name="Picture 11">
+            <a:extLst>
+              <a:ext uri="{FF2B5EF4-FFF2-40B4-BE49-F238E27FC236}">
+                <a16:creationId xmlns:a16="http://schemas.microsoft.com/office/drawing/2014/main" id="{D3C4FA59-9BF6-4F85-95ED-8CEB30F15330}"/>
+              </a:ext>
+            </a:extLst>
+          </p:cNvPr>
+          <p:cNvPicPr>
+            <a:picLocks noChangeAspect="1"/>
+          </p:cNvPicPr>
+          <p:nvPr/>
+        </p:nvPicPr>
+        <p:blipFill>
+          <a:blip r:embed="rId2"/>
+          <a:stretch>
+            <a:fillRect/>
+          </a:stretch>
+        </p:blipFill>
+        <p:spPr>
+          <a:xfrm>
+            <a:off x="3646780" y="1585674"/>
+            <a:ext cx="4898440" cy="3194634"/>
+          </a:xfrm>
+          <a:prstGeom prst="rect">
+            <a:avLst/>
+          </a:prstGeom>
+        </p:spPr>
+      </p:pic>
+    </p:spTree>
+    <p:extLst>
+      <p:ext uri="{BB962C8B-B14F-4D97-AF65-F5344CB8AC3E}">
+        <p14:creationId xmlns:p14="http://schemas.microsoft.com/office/powerpoint/2010/main" val="2790860877"/>
+      </p:ext>
+    </p:extLst>
+  </p:cSld>
+  <p:clrMapOvr>
+    <a:masterClrMapping/>
+  </p:clrMapOvr>
+</p:sld>
+</file>
+
+<file path=ppt/slides/slide26.xml><?xml version="1.0" encoding="utf-8"?>
+<p:sld xmlns:a="http://schemas.openxmlformats.org/drawingml/2006/main" xmlns:r="http://schemas.openxmlformats.org/officeDocument/2006/relationships" xmlns:p="http://schemas.openxmlformats.org/presentationml/2006/main">
+  <p:cSld>
+    <p:spTree>
+      <p:nvGrpSpPr>
+        <p:cNvPr id="1" name=""/>
+        <p:cNvGrpSpPr/>
+        <p:nvPr/>
+      </p:nvGrpSpPr>
+      <p:grpSpPr>
+        <a:xfrm>
+          <a:off x="0" y="0"/>
+          <a:ext cx="0" cy="0"/>
+          <a:chOff x="0" y="0"/>
+          <a:chExt cx="0" cy="0"/>
+        </a:xfrm>
+      </p:grpSpPr>
+      <p:sp>
+        <p:nvSpPr>
+          <p:cNvPr id="2" name="Title 1">
+            <a:extLst>
+              <a:ext uri="{FF2B5EF4-FFF2-40B4-BE49-F238E27FC236}">
+                <a16:creationId xmlns:a16="http://schemas.microsoft.com/office/drawing/2014/main" id="{97038DD9-6958-4FFC-A9DA-C4EF73F6487C}"/>
+              </a:ext>
+            </a:extLst>
+          </p:cNvPr>
+          <p:cNvSpPr>
+            <a:spLocks noGrp="1"/>
+          </p:cNvSpPr>
+          <p:nvPr>
+            <p:ph type="title"/>
+          </p:nvPr>
+        </p:nvSpPr>
+        <p:spPr/>
+        <p:txBody>
+          <a:bodyPr/>
+          <a:lstStyle/>
+          <a:p>
+            <a:r>
+              <a:rPr lang="en-PH" dirty="0"/>
+              <a:t>In the browser it looks like this</a:t>
+            </a:r>
+          </a:p>
+        </p:txBody>
+      </p:sp>
+      <p:pic>
+        <p:nvPicPr>
+          <p:cNvPr id="5" name="Picture 4">
+            <a:extLst>
+              <a:ext uri="{FF2B5EF4-FFF2-40B4-BE49-F238E27FC236}">
+                <a16:creationId xmlns:a16="http://schemas.microsoft.com/office/drawing/2014/main" id="{BB6AA715-8BDB-4EF9-ABC2-1B0E3644ED2C}"/>
+              </a:ext>
+            </a:extLst>
+          </p:cNvPr>
+          <p:cNvPicPr>
+            <a:picLocks noChangeAspect="1"/>
+          </p:cNvPicPr>
+          <p:nvPr/>
+        </p:nvPicPr>
+        <p:blipFill>
+          <a:blip r:embed="rId2"/>
+          <a:stretch>
+            <a:fillRect/>
+          </a:stretch>
+        </p:blipFill>
+        <p:spPr>
+          <a:xfrm>
+            <a:off x="1551008" y="1708936"/>
+            <a:ext cx="9421792" cy="4599267"/>
+          </a:xfrm>
+          <a:prstGeom prst="rect">
+            <a:avLst/>
+          </a:prstGeom>
+        </p:spPr>
+      </p:pic>
+    </p:spTree>
+    <p:extLst>
+      <p:ext uri="{BB962C8B-B14F-4D97-AF65-F5344CB8AC3E}">
+        <p14:creationId xmlns:p14="http://schemas.microsoft.com/office/powerpoint/2010/main" val="1526651936"/>
+      </p:ext>
+    </p:extLst>
+  </p:cSld>
+  <p:clrMapOvr>
+    <a:masterClrMapping/>
+  </p:clrMapOvr>
+</p:sld>
+</file>
+
+<file path=ppt/slides/slide27.xml><?xml version="1.0" encoding="utf-8"?>
+<p:sld xmlns:a="http://schemas.openxmlformats.org/drawingml/2006/main" xmlns:r="http://schemas.openxmlformats.org/officeDocument/2006/relationships" xmlns:p="http://schemas.openxmlformats.org/presentationml/2006/main">
+  <p:cSld>
+    <p:spTree>
+      <p:nvGrpSpPr>
+        <p:cNvPr id="1" name=""/>
+        <p:cNvGrpSpPr/>
+        <p:nvPr/>
+      </p:nvGrpSpPr>
+      <p:grpSpPr>
+        <a:xfrm>
+          <a:off x="0" y="0"/>
+          <a:ext cx="0" cy="0"/>
+          <a:chOff x="0" y="0"/>
+          <a:chExt cx="0" cy="0"/>
+        </a:xfrm>
+      </p:grpSpPr>
+      <p:sp>
+        <p:nvSpPr>
+          <p:cNvPr id="2" name="Title 1">
+            <a:extLst>
+              <a:ext uri="{FF2B5EF4-FFF2-40B4-BE49-F238E27FC236}">
+                <a16:creationId xmlns:a16="http://schemas.microsoft.com/office/drawing/2014/main" id="{1D944047-79F1-4C8A-8190-4DAE317E7E2B}"/>
+              </a:ext>
+            </a:extLst>
+          </p:cNvPr>
+          <p:cNvSpPr>
+            <a:spLocks noGrp="1"/>
+          </p:cNvSpPr>
+          <p:nvPr>
+            <p:ph type="title"/>
+          </p:nvPr>
+        </p:nvSpPr>
+        <p:spPr>
+          <a:xfrm>
+            <a:off x="5159448" y="4491108"/>
+            <a:ext cx="2330304" cy="792126"/>
+          </a:xfrm>
+        </p:spPr>
+        <p:txBody>
+          <a:bodyPr/>
+          <a:lstStyle/>
+          <a:p>
+            <a:r>
+              <a:rPr lang="en-PH" sz="2400" dirty="0"/>
+              <a:t>Fix size in HTML </a:t>
+            </a:r>
+            <a:endParaRPr lang="en-PH" dirty="0"/>
+          </a:p>
+        </p:txBody>
+      </p:sp>
+      <p:sp>
+        <p:nvSpPr>
+          <p:cNvPr id="6" name="Title 1">
+            <a:extLst>
+              <a:ext uri="{FF2B5EF4-FFF2-40B4-BE49-F238E27FC236}">
+                <a16:creationId xmlns:a16="http://schemas.microsoft.com/office/drawing/2014/main" id="{0389ED01-1ECF-4B02-BCA0-58952D5E39F4}"/>
+              </a:ext>
+            </a:extLst>
+          </p:cNvPr>
+          <p:cNvSpPr txBox="1">
+            <a:spLocks/>
+          </p:cNvSpPr>
+          <p:nvPr/>
+        </p:nvSpPr>
+        <p:spPr>
+          <a:xfrm>
+            <a:off x="1524000" y="838200"/>
+            <a:ext cx="9601200" cy="792126"/>
+          </a:xfrm>
+          <a:prstGeom prst="rect">
+            <a:avLst/>
+          </a:prstGeom>
+        </p:spPr>
+        <p:txBody>
+          <a:bodyPr vert="horz" lIns="91440" tIns="45720" rIns="91440" bIns="45720" rtlCol="0" anchor="t">
+            <a:normAutofit/>
+          </a:bodyPr>
+          <a:lstStyle>
+            <a:lvl1pPr algn="l" defTabSz="914400" rtl="0" eaLnBrk="1" latinLnBrk="0" hangingPunct="1">
+              <a:lnSpc>
+                <a:spcPct val="89000"/>
+              </a:lnSpc>
+              <a:spcBef>
+                <a:spcPct val="0"/>
+              </a:spcBef>
+              <a:buNone/>
+              <a:defRPr sz="4400" kern="1200" baseline="0">
+                <a:solidFill>
+                  <a:schemeClr val="tx2"/>
+                </a:solidFill>
+                <a:latin typeface="+mj-lt"/>
+                <a:ea typeface="+mj-ea"/>
+                <a:cs typeface="+mj-cs"/>
+              </a:defRPr>
+            </a:lvl1pPr>
+          </a:lstStyle>
+          <a:p>
+            <a:r>
+              <a:rPr lang="en-PH" dirty="0"/>
+              <a:t>Paragraph</a:t>
+            </a:r>
+          </a:p>
+        </p:txBody>
+      </p:sp>
+      <p:pic>
+        <p:nvPicPr>
+          <p:cNvPr id="10" name="Picture 9">
+            <a:extLst>
+              <a:ext uri="{FF2B5EF4-FFF2-40B4-BE49-F238E27FC236}">
+                <a16:creationId xmlns:a16="http://schemas.microsoft.com/office/drawing/2014/main" id="{63134F31-5D9D-4F47-A30C-411F1A975484}"/>
+              </a:ext>
+            </a:extLst>
+          </p:cNvPr>
+          <p:cNvPicPr>
+            <a:picLocks noChangeAspect="1"/>
+          </p:cNvPicPr>
+          <p:nvPr/>
+        </p:nvPicPr>
+        <p:blipFill>
+          <a:blip r:embed="rId2"/>
+          <a:stretch>
+            <a:fillRect/>
+          </a:stretch>
+        </p:blipFill>
+        <p:spPr>
+          <a:xfrm>
+            <a:off x="1885003" y="2041101"/>
+            <a:ext cx="8421994" cy="2318249"/>
+          </a:xfrm>
+          <a:prstGeom prst="rect">
+            <a:avLst/>
+          </a:prstGeom>
+        </p:spPr>
+      </p:pic>
+    </p:spTree>
+    <p:extLst>
+      <p:ext uri="{BB962C8B-B14F-4D97-AF65-F5344CB8AC3E}">
+        <p14:creationId xmlns:p14="http://schemas.microsoft.com/office/powerpoint/2010/main" val="2411022077"/>
+      </p:ext>
+    </p:extLst>
+  </p:cSld>
+  <p:clrMapOvr>
+    <a:masterClrMapping/>
+  </p:clrMapOvr>
+</p:sld>
+</file>
+
+<file path=ppt/slides/slide28.xml><?xml version="1.0" encoding="utf-8"?>
+<p:sld xmlns:a="http://schemas.openxmlformats.org/drawingml/2006/main" xmlns:r="http://schemas.openxmlformats.org/officeDocument/2006/relationships" xmlns:p="http://schemas.openxmlformats.org/presentationml/2006/main">
+  <p:cSld>
+    <p:spTree>
+      <p:nvGrpSpPr>
+        <p:cNvPr id="1" name=""/>
+        <p:cNvGrpSpPr/>
+        <p:nvPr/>
+      </p:nvGrpSpPr>
+      <p:grpSpPr>
+        <a:xfrm>
+          <a:off x="0" y="0"/>
+          <a:ext cx="0" cy="0"/>
+          <a:chOff x="0" y="0"/>
+          <a:chExt cx="0" cy="0"/>
+        </a:xfrm>
+      </p:grpSpPr>
+      <p:sp>
+        <p:nvSpPr>
+          <p:cNvPr id="2" name="Title 1">
+            <a:extLst>
+              <a:ext uri="{FF2B5EF4-FFF2-40B4-BE49-F238E27FC236}">
+                <a16:creationId xmlns:a16="http://schemas.microsoft.com/office/drawing/2014/main" id="{97038DD9-6958-4FFC-A9DA-C4EF73F6487C}"/>
+              </a:ext>
+            </a:extLst>
+          </p:cNvPr>
+          <p:cNvSpPr>
+            <a:spLocks noGrp="1"/>
+          </p:cNvSpPr>
+          <p:nvPr>
+            <p:ph type="title"/>
+          </p:nvPr>
+        </p:nvSpPr>
+        <p:spPr/>
+        <p:txBody>
+          <a:bodyPr/>
+          <a:lstStyle/>
+          <a:p>
+            <a:r>
+              <a:rPr lang="en-PH" dirty="0"/>
+              <a:t>In the browser it looks like this</a:t>
+            </a:r>
+          </a:p>
+        </p:txBody>
+      </p:sp>
+      <p:pic>
+        <p:nvPicPr>
+          <p:cNvPr id="4" name="Picture 3">
+            <a:extLst>
+              <a:ext uri="{FF2B5EF4-FFF2-40B4-BE49-F238E27FC236}">
+                <a16:creationId xmlns:a16="http://schemas.microsoft.com/office/drawing/2014/main" id="{853ABD72-7FBB-47BE-A0FF-167449C2EEA7}"/>
+              </a:ext>
+            </a:extLst>
+          </p:cNvPr>
+          <p:cNvPicPr>
+            <a:picLocks noChangeAspect="1"/>
+          </p:cNvPicPr>
+          <p:nvPr/>
+        </p:nvPicPr>
+        <p:blipFill>
+          <a:blip r:embed="rId2"/>
+          <a:stretch>
+            <a:fillRect/>
+          </a:stretch>
+        </p:blipFill>
+        <p:spPr>
+          <a:xfrm>
+            <a:off x="1659452" y="1948229"/>
+            <a:ext cx="8873095" cy="2961542"/>
+          </a:xfrm>
+          <a:prstGeom prst="rect">
+            <a:avLst/>
+          </a:prstGeom>
+        </p:spPr>
+      </p:pic>
+    </p:spTree>
+    <p:extLst>
+      <p:ext uri="{BB962C8B-B14F-4D97-AF65-F5344CB8AC3E}">
+        <p14:creationId xmlns:p14="http://schemas.microsoft.com/office/powerpoint/2010/main" val="2318908670"/>
+      </p:ext>
+    </p:extLst>
+  </p:cSld>
+  <p:clrMapOvr>
+    <a:masterClrMapping/>
+  </p:clrMapOvr>
+</p:sld>
+</file>
+
+<file path=ppt/slides/slide29.xml><?xml version="1.0" encoding="utf-8"?>
+<p:sld xmlns:a="http://schemas.openxmlformats.org/drawingml/2006/main" xmlns:r="http://schemas.openxmlformats.org/officeDocument/2006/relationships" xmlns:p="http://schemas.openxmlformats.org/presentationml/2006/main">
+  <p:cSld>
+    <p:spTree>
+      <p:nvGrpSpPr>
+        <p:cNvPr id="1" name=""/>
+        <p:cNvGrpSpPr/>
+        <p:nvPr/>
+      </p:nvGrpSpPr>
+      <p:grpSpPr>
+        <a:xfrm>
+          <a:off x="0" y="0"/>
+          <a:ext cx="0" cy="0"/>
+          <a:chOff x="0" y="0"/>
+          <a:chExt cx="0" cy="0"/>
+        </a:xfrm>
+      </p:grpSpPr>
+      <p:sp>
+        <p:nvSpPr>
+          <p:cNvPr id="2" name="Title 1">
+            <a:extLst>
+              <a:ext uri="{FF2B5EF4-FFF2-40B4-BE49-F238E27FC236}">
+                <a16:creationId xmlns:a16="http://schemas.microsoft.com/office/drawing/2014/main" id="{CF734871-093B-46AF-82DA-C0E1DC7ED3EC}"/>
+              </a:ext>
+            </a:extLst>
+          </p:cNvPr>
+          <p:cNvSpPr>
+            <a:spLocks noGrp="1"/>
+          </p:cNvSpPr>
+          <p:nvPr>
+            <p:ph type="title"/>
+          </p:nvPr>
+        </p:nvSpPr>
+        <p:spPr/>
+        <p:txBody>
+          <a:bodyPr/>
+          <a:lstStyle/>
+          <a:p>
+            <a:r>
+              <a:rPr lang="en-PH" dirty="0"/>
+              <a:t>Combination</a:t>
+            </a:r>
+          </a:p>
+        </p:txBody>
+      </p:sp>
+      <p:pic>
+        <p:nvPicPr>
+          <p:cNvPr id="9" name="Picture 8">
+            <a:extLst>
+              <a:ext uri="{FF2B5EF4-FFF2-40B4-BE49-F238E27FC236}">
+                <a16:creationId xmlns:a16="http://schemas.microsoft.com/office/drawing/2014/main" id="{A8948908-0BD5-4D18-BBFE-BABDBADC7B6C}"/>
+              </a:ext>
+            </a:extLst>
+          </p:cNvPr>
+          <p:cNvPicPr>
+            <a:picLocks noChangeAspect="1"/>
+          </p:cNvPicPr>
+          <p:nvPr/>
+        </p:nvPicPr>
+        <p:blipFill>
+          <a:blip r:embed="rId2"/>
+          <a:stretch>
+            <a:fillRect/>
+          </a:stretch>
+        </p:blipFill>
+        <p:spPr>
+          <a:xfrm>
+            <a:off x="1768549" y="1773666"/>
+            <a:ext cx="8807302" cy="3149208"/>
+          </a:xfrm>
+          <a:prstGeom prst="rect">
+            <a:avLst/>
+          </a:prstGeom>
+        </p:spPr>
+      </p:pic>
+    </p:spTree>
+    <p:extLst>
+      <p:ext uri="{BB962C8B-B14F-4D97-AF65-F5344CB8AC3E}">
+        <p14:creationId xmlns:p14="http://schemas.microsoft.com/office/powerpoint/2010/main" val="4273572065"/>
+      </p:ext>
+    </p:extLst>
+  </p:cSld>
+  <p:clrMapOvr>
+    <a:masterClrMapping/>
+  </p:clrMapOvr>
+</p:sld>
+</file>
+
 <file path=ppt/slides/slide3.xml><?xml version="1.0" encoding="utf-8"?>
 <p:sld xmlns:a="http://schemas.openxmlformats.org/drawingml/2006/main" xmlns:r="http://schemas.openxmlformats.org/officeDocument/2006/relationships" xmlns:p="http://schemas.openxmlformats.org/presentationml/2006/main">
   <p:cSld>
@@ -9557,6 +10333,124 @@
       <p:bldP spid="3" grpId="0" build="p"/>
     </p:bldLst>
   </p:timing>
+</p:sld>
+</file>
+
+<file path=ppt/slides/slide30.xml><?xml version="1.0" encoding="utf-8"?>
+<p:sld xmlns:a="http://schemas.openxmlformats.org/drawingml/2006/main" xmlns:r="http://schemas.openxmlformats.org/officeDocument/2006/relationships" xmlns:p="http://schemas.openxmlformats.org/presentationml/2006/main">
+  <p:cSld>
+    <p:spTree>
+      <p:nvGrpSpPr>
+        <p:cNvPr id="1" name=""/>
+        <p:cNvGrpSpPr/>
+        <p:nvPr/>
+      </p:nvGrpSpPr>
+      <p:grpSpPr>
+        <a:xfrm>
+          <a:off x="0" y="0"/>
+          <a:ext cx="0" cy="0"/>
+          <a:chOff x="0" y="0"/>
+          <a:chExt cx="0" cy="0"/>
+        </a:xfrm>
+      </p:grpSpPr>
+      <p:pic>
+        <p:nvPicPr>
+          <p:cNvPr id="5" name="Content Placeholder 4">
+            <a:extLst>
+              <a:ext uri="{FF2B5EF4-FFF2-40B4-BE49-F238E27FC236}">
+                <a16:creationId xmlns:a16="http://schemas.microsoft.com/office/drawing/2014/main" id="{AFFA9B9A-8444-4E68-8BD3-077598859D0E}"/>
+              </a:ext>
+            </a:extLst>
+          </p:cNvPr>
+          <p:cNvPicPr>
+            <a:picLocks noGrp="1" noChangeAspect="1"/>
+          </p:cNvPicPr>
+          <p:nvPr>
+            <p:ph idx="1"/>
+          </p:nvPr>
+        </p:nvPicPr>
+        <p:blipFill>
+          <a:blip r:embed="rId2"/>
+          <a:stretch>
+            <a:fillRect/>
+          </a:stretch>
+        </p:blipFill>
+        <p:spPr>
+          <a:xfrm>
+            <a:off x="1584183" y="1551277"/>
+            <a:ext cx="9388617" cy="3755446"/>
+          </a:xfrm>
+        </p:spPr>
+      </p:pic>
+    </p:spTree>
+    <p:extLst>
+      <p:ext uri="{BB962C8B-B14F-4D97-AF65-F5344CB8AC3E}">
+        <p14:creationId xmlns:p14="http://schemas.microsoft.com/office/powerpoint/2010/main" val="3547925868"/>
+      </p:ext>
+    </p:extLst>
+  </p:cSld>
+  <p:clrMapOvr>
+    <a:masterClrMapping/>
+  </p:clrMapOvr>
+</p:sld>
+</file>
+
+<file path=ppt/slides/slide31.xml><?xml version="1.0" encoding="utf-8"?>
+<p:sld xmlns:a="http://schemas.openxmlformats.org/drawingml/2006/main" xmlns:r="http://schemas.openxmlformats.org/officeDocument/2006/relationships" xmlns:p="http://schemas.openxmlformats.org/presentationml/2006/main">
+  <p:cSld>
+    <p:spTree>
+      <p:nvGrpSpPr>
+        <p:cNvPr id="1" name=""/>
+        <p:cNvGrpSpPr/>
+        <p:nvPr/>
+      </p:nvGrpSpPr>
+      <p:grpSpPr>
+        <a:xfrm>
+          <a:off x="0" y="0"/>
+          <a:ext cx="0" cy="0"/>
+          <a:chOff x="0" y="0"/>
+          <a:chExt cx="0" cy="0"/>
+        </a:xfrm>
+      </p:grpSpPr>
+      <p:pic>
+        <p:nvPicPr>
+          <p:cNvPr id="5" name="Content Placeholder 4">
+            <a:extLst>
+              <a:ext uri="{FF2B5EF4-FFF2-40B4-BE49-F238E27FC236}">
+                <a16:creationId xmlns:a16="http://schemas.microsoft.com/office/drawing/2014/main" id="{2B7DE2C2-508C-4D7E-8476-0AFF9DC0C69C}"/>
+              </a:ext>
+            </a:extLst>
+          </p:cNvPr>
+          <p:cNvPicPr>
+            <a:picLocks noGrp="1" noChangeAspect="1"/>
+          </p:cNvPicPr>
+          <p:nvPr>
+            <p:ph idx="1"/>
+          </p:nvPr>
+        </p:nvPicPr>
+        <p:blipFill>
+          <a:blip r:embed="rId2"/>
+          <a:stretch>
+            <a:fillRect/>
+          </a:stretch>
+        </p:blipFill>
+        <p:spPr>
+          <a:xfrm>
+            <a:off x="3187631" y="2099382"/>
+            <a:ext cx="5816737" cy="2908369"/>
+          </a:xfrm>
+        </p:spPr>
+      </p:pic>
+    </p:spTree>
+    <p:extLst>
+      <p:ext uri="{BB962C8B-B14F-4D97-AF65-F5344CB8AC3E}">
+        <p14:creationId xmlns:p14="http://schemas.microsoft.com/office/powerpoint/2010/main" val="3025563283"/>
+      </p:ext>
+    </p:extLst>
+  </p:cSld>
+  <p:clrMapOvr>
+    <a:masterClrMapping/>
+  </p:clrMapOvr>
 </p:sld>
 </file>
 

</xml_diff>

<commit_message>
a tags and butt
</commit_message>
<xml_diff>
--- a/HTML BASICS.pptx
+++ b/HTML BASICS.pptx
@@ -46,6 +46,7 @@
     <p:sldId id="295" r:id="rId40"/>
     <p:sldId id="296" r:id="rId41"/>
     <p:sldId id="297" r:id="rId42"/>
+    <p:sldId id="298" r:id="rId43"/>
   </p:sldIdLst>
   <p:sldSz cx="12192000" cy="6858000"/>
   <p:notesSz cx="6858000" cy="9144000"/>
@@ -322,7 +323,7 @@
             <a:fld id="{87DE6118-2437-4B30-8E3C-4D2BE6020583}" type="datetimeFigureOut">
               <a:rPr lang="en-US" dirty="0"/>
               <a:pPr/>
-              <a:t>9/7/2021</a:t>
+              <a:t>9/9/2021</a:t>
             </a:fld>
             <a:endParaRPr lang="en-US" dirty="0"/>
           </a:p>
@@ -648,7 +649,7 @@
           <a:p>
             <a:fld id="{87DE6118-2437-4B30-8E3C-4D2BE6020583}" type="datetimeFigureOut">
               <a:rPr lang="en-US" dirty="0"/>
-              <a:t>9/7/2021</a:t>
+              <a:t>9/9/2021</a:t>
             </a:fld>
             <a:endParaRPr lang="en-US" dirty="0"/>
           </a:p>
@@ -823,7 +824,7 @@
           <a:p>
             <a:fld id="{87DE6118-2437-4B30-8E3C-4D2BE6020583}" type="datetimeFigureOut">
               <a:rPr lang="en-US" dirty="0"/>
-              <a:t>9/7/2021</a:t>
+              <a:t>9/9/2021</a:t>
             </a:fld>
             <a:endParaRPr lang="en-US" dirty="0"/>
           </a:p>
@@ -988,7 +989,7 @@
           <a:p>
             <a:fld id="{87DE6118-2437-4B30-8E3C-4D2BE6020583}" type="datetimeFigureOut">
               <a:rPr lang="en-US" dirty="0"/>
-              <a:t>9/7/2021</a:t>
+              <a:t>9/9/2021</a:t>
             </a:fld>
             <a:endParaRPr lang="en-US" dirty="0"/>
           </a:p>
@@ -1261,7 +1262,7 @@
             <a:fld id="{87DE6118-2437-4B30-8E3C-4D2BE6020583}" type="datetimeFigureOut">
               <a:rPr lang="en-US" dirty="0"/>
               <a:pPr/>
-              <a:t>9/7/2021</a:t>
+              <a:t>9/9/2021</a:t>
             </a:fld>
             <a:endParaRPr lang="en-US" dirty="0"/>
           </a:p>
@@ -1651,7 +1652,7 @@
           <a:p>
             <a:fld id="{87DE6118-2437-4B30-8E3C-4D2BE6020583}" type="datetimeFigureOut">
               <a:rPr lang="en-US" dirty="0"/>
-              <a:t>9/7/2021</a:t>
+              <a:t>9/9/2021</a:t>
             </a:fld>
             <a:endParaRPr lang="en-US" dirty="0"/>
           </a:p>
@@ -2123,7 +2124,7 @@
           <a:p>
             <a:fld id="{87DE6118-2437-4B30-8E3C-4D2BE6020583}" type="datetimeFigureOut">
               <a:rPr lang="en-US" dirty="0"/>
-              <a:t>9/7/2021</a:t>
+              <a:t>9/9/2021</a:t>
             </a:fld>
             <a:endParaRPr lang="en-US" dirty="0"/>
           </a:p>
@@ -2236,7 +2237,7 @@
           <a:p>
             <a:fld id="{87DE6118-2437-4B30-8E3C-4D2BE6020583}" type="datetimeFigureOut">
               <a:rPr lang="en-US" dirty="0"/>
-              <a:t>9/7/2021</a:t>
+              <a:t>9/9/2021</a:t>
             </a:fld>
             <a:endParaRPr lang="en-US" dirty="0"/>
           </a:p>
@@ -2326,7 +2327,7 @@
           <a:p>
             <a:fld id="{87DE6118-2437-4B30-8E3C-4D2BE6020583}" type="datetimeFigureOut">
               <a:rPr lang="en-US" dirty="0"/>
-              <a:t>9/7/2021</a:t>
+              <a:t>9/9/2021</a:t>
             </a:fld>
             <a:endParaRPr lang="en-US" dirty="0"/>
           </a:p>
@@ -2668,7 +2669,7 @@
             <a:fld id="{87DE6118-2437-4B30-8E3C-4D2BE6020583}" type="datetimeFigureOut">
               <a:rPr lang="en-US" dirty="0"/>
               <a:pPr/>
-              <a:t>9/7/2021</a:t>
+              <a:t>9/9/2021</a:t>
             </a:fld>
             <a:endParaRPr lang="en-US" dirty="0"/>
           </a:p>
@@ -3053,7 +3054,7 @@
             <a:fld id="{87DE6118-2437-4B30-8E3C-4D2BE6020583}" type="datetimeFigureOut">
               <a:rPr lang="en-US" dirty="0"/>
               <a:pPr/>
-              <a:t>9/7/2021</a:t>
+              <a:t>9/9/2021</a:t>
             </a:fld>
             <a:endParaRPr lang="en-US" dirty="0"/>
           </a:p>
@@ -3328,7 +3329,7 @@
             <a:fld id="{87DE6118-2437-4B30-8E3C-4D2BE6020583}" type="datetimeFigureOut">
               <a:rPr lang="en-US" dirty="0"/>
               <a:pPr/>
-              <a:t>9/7/2021</a:t>
+              <a:t>9/9/2021</a:t>
             </a:fld>
             <a:endParaRPr lang="en-US" dirty="0"/>
           </a:p>
@@ -14029,6 +14030,214 @@
 </p:sld>
 </file>
 
+<file path=ppt/slides/slide42.xml><?xml version="1.0" encoding="utf-8"?>
+<p:sld xmlns:a="http://schemas.openxmlformats.org/drawingml/2006/main" xmlns:r="http://schemas.openxmlformats.org/officeDocument/2006/relationships" xmlns:p="http://schemas.openxmlformats.org/presentationml/2006/main">
+  <p:cSld>
+    <p:spTree>
+      <p:nvGrpSpPr>
+        <p:cNvPr id="1" name=""/>
+        <p:cNvGrpSpPr/>
+        <p:nvPr/>
+      </p:nvGrpSpPr>
+      <p:grpSpPr>
+        <a:xfrm>
+          <a:off x="0" y="0"/>
+          <a:ext cx="0" cy="0"/>
+          <a:chOff x="0" y="0"/>
+          <a:chExt cx="0" cy="0"/>
+        </a:xfrm>
+      </p:grpSpPr>
+      <p:sp>
+        <p:nvSpPr>
+          <p:cNvPr id="2" name="Title 1">
+            <a:extLst>
+              <a:ext uri="{FF2B5EF4-FFF2-40B4-BE49-F238E27FC236}">
+                <a16:creationId xmlns:a16="http://schemas.microsoft.com/office/drawing/2014/main" id="{9B3E5BCA-BB79-4494-943A-99CF5F49102F}"/>
+              </a:ext>
+            </a:extLst>
+          </p:cNvPr>
+          <p:cNvSpPr>
+            <a:spLocks noGrp="1"/>
+          </p:cNvSpPr>
+          <p:nvPr>
+            <p:ph type="ctrTitle"/>
+          </p:nvPr>
+        </p:nvSpPr>
+        <p:spPr>
+          <a:xfrm>
+            <a:off x="1915385" y="1058346"/>
+            <a:ext cx="8361229" cy="2098226"/>
+          </a:xfrm>
+        </p:spPr>
+        <p:txBody>
+          <a:bodyPr/>
+          <a:lstStyle/>
+          <a:p>
+            <a:r>
+              <a:rPr lang="en-PH" dirty="0"/>
+              <a:t>HTML BASICS</a:t>
+            </a:r>
+          </a:p>
+        </p:txBody>
+      </p:sp>
+      <p:sp>
+        <p:nvSpPr>
+          <p:cNvPr id="3" name="Subtitle 2">
+            <a:extLst>
+              <a:ext uri="{FF2B5EF4-FFF2-40B4-BE49-F238E27FC236}">
+                <a16:creationId xmlns:a16="http://schemas.microsoft.com/office/drawing/2014/main" id="{AEC855E7-1E83-4728-BDA9-FB3D80108F3A}"/>
+              </a:ext>
+            </a:extLst>
+          </p:cNvPr>
+          <p:cNvSpPr>
+            <a:spLocks noGrp="1"/>
+          </p:cNvSpPr>
+          <p:nvPr>
+            <p:ph type="subTitle" idx="1"/>
+          </p:nvPr>
+        </p:nvSpPr>
+        <p:spPr>
+          <a:xfrm>
+            <a:off x="6685849" y="5338765"/>
+            <a:ext cx="6831673" cy="1086237"/>
+          </a:xfrm>
+        </p:spPr>
+        <p:txBody>
+          <a:bodyPr/>
+          <a:lstStyle/>
+          <a:p>
+            <a:r>
+              <a:rPr lang="en-PH" dirty="0"/>
+              <a:t>By Ronald Laz</a:t>
+            </a:r>
+          </a:p>
+        </p:txBody>
+      </p:sp>
+      <p:sp>
+        <p:nvSpPr>
+          <p:cNvPr id="4" name="Title 1">
+            <a:extLst>
+              <a:ext uri="{FF2B5EF4-FFF2-40B4-BE49-F238E27FC236}">
+                <a16:creationId xmlns:a16="http://schemas.microsoft.com/office/drawing/2014/main" id="{110DDF52-F283-4292-9D4B-49FAAD7F1EFF}"/>
+              </a:ext>
+            </a:extLst>
+          </p:cNvPr>
+          <p:cNvSpPr txBox="1">
+            <a:spLocks/>
+          </p:cNvSpPr>
+          <p:nvPr/>
+        </p:nvSpPr>
+        <p:spPr>
+          <a:xfrm>
+            <a:off x="1915384" y="3083203"/>
+            <a:ext cx="8361229" cy="544856"/>
+          </a:xfrm>
+          <a:prstGeom prst="rect">
+            <a:avLst/>
+          </a:prstGeom>
+        </p:spPr>
+        <p:txBody>
+          <a:bodyPr vert="horz" lIns="91440" tIns="45720" rIns="91440" bIns="45720" rtlCol="0" anchor="b">
+            <a:noAutofit/>
+          </a:bodyPr>
+          <a:lstStyle>
+            <a:lvl1pPr algn="ctr" defTabSz="914400" rtl="0" eaLnBrk="1" latinLnBrk="0" hangingPunct="1">
+              <a:lnSpc>
+                <a:spcPct val="89000"/>
+              </a:lnSpc>
+              <a:spcBef>
+                <a:spcPct val="0"/>
+              </a:spcBef>
+              <a:buNone/>
+              <a:defRPr sz="7200" kern="1200" cap="all" baseline="0">
+                <a:solidFill>
+                  <a:schemeClr val="tx2"/>
+                </a:solidFill>
+                <a:latin typeface="+mj-lt"/>
+                <a:ea typeface="+mj-ea"/>
+                <a:cs typeface="+mj-cs"/>
+              </a:defRPr>
+            </a:lvl1pPr>
+          </a:lstStyle>
+          <a:p>
+            <a:r>
+              <a:rPr lang="en-PH" sz="2800" dirty="0"/>
+              <a:t>Tags you can find inside the html body</a:t>
+            </a:r>
+          </a:p>
+        </p:txBody>
+      </p:sp>
+      <p:sp>
+        <p:nvSpPr>
+          <p:cNvPr id="5" name="Title 1">
+            <a:extLst>
+              <a:ext uri="{FF2B5EF4-FFF2-40B4-BE49-F238E27FC236}">
+                <a16:creationId xmlns:a16="http://schemas.microsoft.com/office/drawing/2014/main" id="{7E2D6452-5B08-4DCC-8B59-CDB8325E0C9A}"/>
+              </a:ext>
+            </a:extLst>
+          </p:cNvPr>
+          <p:cNvSpPr txBox="1">
+            <a:spLocks/>
+          </p:cNvSpPr>
+          <p:nvPr/>
+        </p:nvSpPr>
+        <p:spPr>
+          <a:xfrm>
+            <a:off x="1915384" y="3306078"/>
+            <a:ext cx="8361229" cy="544856"/>
+          </a:xfrm>
+          <a:prstGeom prst="rect">
+            <a:avLst/>
+          </a:prstGeom>
+        </p:spPr>
+        <p:txBody>
+          <a:bodyPr vert="horz" lIns="91440" tIns="45720" rIns="91440" bIns="45720" rtlCol="0" anchor="b">
+            <a:noAutofit/>
+          </a:bodyPr>
+          <a:lstStyle>
+            <a:lvl1pPr algn="ctr" defTabSz="914400" rtl="0" eaLnBrk="1" latinLnBrk="0" hangingPunct="1">
+              <a:lnSpc>
+                <a:spcPct val="89000"/>
+              </a:lnSpc>
+              <a:spcBef>
+                <a:spcPct val="0"/>
+              </a:spcBef>
+              <a:buNone/>
+              <a:defRPr sz="7200" kern="1200" cap="all" baseline="0">
+                <a:solidFill>
+                  <a:schemeClr val="tx2"/>
+                </a:solidFill>
+                <a:latin typeface="+mj-lt"/>
+                <a:ea typeface="+mj-ea"/>
+                <a:cs typeface="+mj-cs"/>
+              </a:defRPr>
+            </a:lvl1pPr>
+          </a:lstStyle>
+          <a:p>
+            <a:r>
+              <a:rPr lang="en-PH" sz="1800" dirty="0">
+                <a:solidFill>
+                  <a:srgbClr val="FF0000"/>
+                </a:solidFill>
+              </a:rPr>
+              <a:t>Buttons and a tag</a:t>
+            </a:r>
+          </a:p>
+        </p:txBody>
+      </p:sp>
+    </p:spTree>
+    <p:extLst>
+      <p:ext uri="{BB962C8B-B14F-4D97-AF65-F5344CB8AC3E}">
+        <p14:creationId xmlns:p14="http://schemas.microsoft.com/office/powerpoint/2010/main" val="2520629050"/>
+      </p:ext>
+    </p:extLst>
+  </p:cSld>
+  <p:clrMapOvr>
+    <a:masterClrMapping/>
+  </p:clrMapOvr>
+</p:sld>
+</file>
+
 <file path=ppt/slides/slide5.xml><?xml version="1.0" encoding="utf-8"?>
 <p:sld xmlns:a="http://schemas.openxmlformats.org/drawingml/2006/main" xmlns:r="http://schemas.openxmlformats.org/officeDocument/2006/relationships" xmlns:p="http://schemas.openxmlformats.org/presentationml/2006/main">
   <p:cSld>

</xml_diff>